<commit_message>
modified 11.05.19 working group presentation
</commit_message>
<xml_diff>
--- a/IMCI_GM_WG_110519.pptx
+++ b/IMCI_GM_WG_110519.pptx
@@ -7,12 +7,13 @@
   <p:sldIdLst>
     <p:sldId id="265" r:id="rId2"/>
     <p:sldId id="258" r:id="rId3"/>
-    <p:sldId id="259" r:id="rId4"/>
-    <p:sldId id="260" r:id="rId5"/>
-    <p:sldId id="261" r:id="rId6"/>
-    <p:sldId id="262" r:id="rId7"/>
-    <p:sldId id="263" r:id="rId8"/>
-    <p:sldId id="266" r:id="rId9"/>
+    <p:sldId id="267" r:id="rId4"/>
+    <p:sldId id="259" r:id="rId5"/>
+    <p:sldId id="260" r:id="rId6"/>
+    <p:sldId id="261" r:id="rId7"/>
+    <p:sldId id="262" r:id="rId8"/>
+    <p:sldId id="263" r:id="rId9"/>
+    <p:sldId id="266" r:id="rId10"/>
   </p:sldIdLst>
   <p:sldSz cx="12192000" cy="6858000"/>
   <p:notesSz cx="6858000" cy="9144000"/>
@@ -3467,7 +3468,7 @@
           <a:p>
             <a:r>
               <a:rPr lang="en-US" dirty="0"/>
-              <a:t>Problem Set Description</a:t>
+              <a:t>Problem Set</a:t>
             </a:r>
           </a:p>
           <a:p>
@@ -3480,6 +3481,13 @@
             <a:pPr lvl="1"/>
             <a:r>
               <a:rPr lang="en-US" dirty="0"/>
+              <a:t>Methodology concept</a:t>
+            </a:r>
+          </a:p>
+          <a:p>
+            <a:pPr lvl="1"/>
+            <a:r>
+              <a:rPr lang="en-US" dirty="0"/>
               <a:t>Data collection</a:t>
             </a:r>
           </a:p>
@@ -3498,22 +3506,24 @@
             </a:r>
           </a:p>
           <a:p>
-            <a:pPr lvl="1"/>
-            <a:r>
-              <a:rPr lang="en-US" dirty="0"/>
-              <a:t>Additional components not considered</a:t>
-            </a:r>
-          </a:p>
-          <a:p>
-            <a:r>
-              <a:rPr lang="en-US" dirty="0"/>
-              <a:t>Timelines</a:t>
-            </a:r>
-          </a:p>
-          <a:p>
-            <a:r>
-              <a:rPr lang="en-US" dirty="0"/>
-              <a:t>Strategies/Logistics for moving forward</a:t>
+            <a:r>
+              <a:rPr lang="en-US" dirty="0"/>
+              <a:t>Timeline/Logistics for moving forward</a:t>
+            </a:r>
+          </a:p>
+          <a:p>
+            <a:r>
+              <a:rPr lang="en-US" dirty="0"/>
+              <a:t>Extra: Literature</a:t>
+            </a:r>
+          </a:p>
+          <a:p>
+            <a:endParaRPr lang="en-US" dirty="0"/>
+          </a:p>
+          <a:p>
+            <a:r>
+              <a:rPr lang="en-US" dirty="0"/>
+              <a:t>Additional missing issues or ideas to discuss</a:t>
             </a:r>
           </a:p>
           <a:p>
@@ -3559,6 +3569,92 @@
           <p:cNvPr id="2" name="Title 1">
             <a:extLst>
               <a:ext uri="{FF2B5EF4-FFF2-40B4-BE49-F238E27FC236}">
+                <a16:creationId xmlns:a16="http://schemas.microsoft.com/office/drawing/2014/main" id="{24238A8B-DDF9-BF4C-BECA-5B7E9D9DDC37}"/>
+              </a:ext>
+            </a:extLst>
+          </p:cNvPr>
+          <p:cNvSpPr>
+            <a:spLocks noGrp="1"/>
+          </p:cNvSpPr>
+          <p:nvPr>
+            <p:ph type="title"/>
+          </p:nvPr>
+        </p:nvSpPr>
+        <p:spPr/>
+        <p:txBody>
+          <a:bodyPr/>
+          <a:lstStyle/>
+          <a:p>
+            <a:r>
+              <a:rPr lang="en-US" dirty="0"/>
+              <a:t>Problem Set	</a:t>
+            </a:r>
+          </a:p>
+        </p:txBody>
+      </p:sp>
+      <p:sp>
+        <p:nvSpPr>
+          <p:cNvPr id="3" name="Content Placeholder 2">
+            <a:extLst>
+              <a:ext uri="{FF2B5EF4-FFF2-40B4-BE49-F238E27FC236}">
+                <a16:creationId xmlns:a16="http://schemas.microsoft.com/office/drawing/2014/main" id="{075BA3BF-C61F-424C-892D-75C30E17D600}"/>
+              </a:ext>
+            </a:extLst>
+          </p:cNvPr>
+          <p:cNvSpPr>
+            <a:spLocks noGrp="1"/>
+          </p:cNvSpPr>
+          <p:nvPr>
+            <p:ph idx="1"/>
+          </p:nvPr>
+        </p:nvSpPr>
+        <p:spPr/>
+        <p:txBody>
+          <a:bodyPr/>
+          <a:lstStyle/>
+          <a:p>
+            <a:r>
+              <a:rPr lang="en-US" dirty="0"/>
+              <a:t>Explore spatiotemporal relationships of human health in comparison to related factors (environmental/socio-economic)</a:t>
+            </a:r>
+          </a:p>
+        </p:txBody>
+      </p:sp>
+    </p:spTree>
+    <p:extLst>
+      <p:ext uri="{BB962C8B-B14F-4D97-AF65-F5344CB8AC3E}">
+        <p14:creationId xmlns:p14="http://schemas.microsoft.com/office/powerpoint/2010/main" val="563385433"/>
+      </p:ext>
+    </p:extLst>
+  </p:cSld>
+  <p:clrMapOvr>
+    <a:masterClrMapping/>
+  </p:clrMapOvr>
+</p:sld>
+</file>
+
+<file path=ppt/slides/slide4.xml><?xml version="1.0" encoding="utf-8"?>
+<p:sld xmlns:a="http://schemas.openxmlformats.org/drawingml/2006/main" xmlns:r="http://schemas.openxmlformats.org/officeDocument/2006/relationships" xmlns:p="http://schemas.openxmlformats.org/presentationml/2006/main">
+  <p:cSld>
+    <p:spTree>
+      <p:nvGrpSpPr>
+        <p:cNvPr id="1" name=""/>
+        <p:cNvGrpSpPr/>
+        <p:nvPr/>
+      </p:nvGrpSpPr>
+      <p:grpSpPr>
+        <a:xfrm>
+          <a:off x="0" y="0"/>
+          <a:ext cx="0" cy="0"/>
+          <a:chOff x="0" y="0"/>
+          <a:chExt cx="0" cy="0"/>
+        </a:xfrm>
+      </p:grpSpPr>
+      <p:sp>
+        <p:nvSpPr>
+          <p:cNvPr id="2" name="Title 1">
+            <a:extLst>
+              <a:ext uri="{FF2B5EF4-FFF2-40B4-BE49-F238E27FC236}">
                 <a16:creationId xmlns:a16="http://schemas.microsoft.com/office/drawing/2014/main" id="{DB138F15-35A1-404D-AF29-865D20B006B4}"/>
               </a:ext>
             </a:extLst>
@@ -3577,7 +3673,7 @@
           <a:p>
             <a:r>
               <a:rPr lang="en-US" dirty="0"/>
-              <a:t>Project Methodology</a:t>
+              <a:t>Project Methodology Concept</a:t>
             </a:r>
           </a:p>
         </p:txBody>
@@ -3610,7 +3706,7 @@
           <a:p>
             <a:r>
               <a:rPr lang="en-US" dirty="0"/>
-              <a:t>Data Assembly and organization</a:t>
+              <a:t>Data assembly and organization</a:t>
             </a:r>
           </a:p>
           <a:p>
@@ -3634,13 +3730,13 @@
           <a:p>
             <a:r>
               <a:rPr lang="en-US" dirty="0"/>
-              <a:t>Model Runs</a:t>
-            </a:r>
-          </a:p>
-          <a:p>
-            <a:r>
-              <a:rPr lang="en-US" dirty="0"/>
-              <a:t>Examine/Repeat</a:t>
+              <a:t>Model runs</a:t>
+            </a:r>
+          </a:p>
+          <a:p>
+            <a:r>
+              <a:rPr lang="en-US" dirty="0"/>
+              <a:t>Examine/repeat</a:t>
             </a:r>
           </a:p>
         </p:txBody>
@@ -3658,7 +3754,7 @@
 </p:sld>
 </file>
 
-<file path=ppt/slides/slide4.xml><?xml version="1.0" encoding="utf-8"?>
+<file path=ppt/slides/slide5.xml><?xml version="1.0" encoding="utf-8"?>
 <p:sld xmlns:a="http://schemas.openxmlformats.org/drawingml/2006/main" xmlns:r="http://schemas.openxmlformats.org/officeDocument/2006/relationships" xmlns:p="http://schemas.openxmlformats.org/presentationml/2006/main">
   <p:cSld>
     <p:spTree>
@@ -4008,92 +4104,6 @@
 </p:sld>
 </file>
 
-<file path=ppt/slides/slide5.xml><?xml version="1.0" encoding="utf-8"?>
-<p:sld xmlns:a="http://schemas.openxmlformats.org/drawingml/2006/main" xmlns:r="http://schemas.openxmlformats.org/officeDocument/2006/relationships" xmlns:p="http://schemas.openxmlformats.org/presentationml/2006/main">
-  <p:cSld>
-    <p:spTree>
-      <p:nvGrpSpPr>
-        <p:cNvPr id="1" name=""/>
-        <p:cNvGrpSpPr/>
-        <p:nvPr/>
-      </p:nvGrpSpPr>
-      <p:grpSpPr>
-        <a:xfrm>
-          <a:off x="0" y="0"/>
-          <a:ext cx="0" cy="0"/>
-          <a:chOff x="0" y="0"/>
-          <a:chExt cx="0" cy="0"/>
-        </a:xfrm>
-      </p:grpSpPr>
-      <p:sp>
-        <p:nvSpPr>
-          <p:cNvPr id="2" name="Title 1">
-            <a:extLst>
-              <a:ext uri="{FF2B5EF4-FFF2-40B4-BE49-F238E27FC236}">
-                <a16:creationId xmlns:a16="http://schemas.microsoft.com/office/drawing/2014/main" id="{2CE79503-F56C-D746-BE73-B513B8732F97}"/>
-              </a:ext>
-            </a:extLst>
-          </p:cNvPr>
-          <p:cNvSpPr>
-            <a:spLocks noGrp="1"/>
-          </p:cNvSpPr>
-          <p:nvPr>
-            <p:ph type="title"/>
-          </p:nvPr>
-        </p:nvSpPr>
-        <p:spPr/>
-        <p:txBody>
-          <a:bodyPr/>
-          <a:lstStyle/>
-          <a:p>
-            <a:r>
-              <a:rPr lang="en-US" dirty="0"/>
-              <a:t>Project Methodology: Data Transformation</a:t>
-            </a:r>
-          </a:p>
-        </p:txBody>
-      </p:sp>
-      <p:sp>
-        <p:nvSpPr>
-          <p:cNvPr id="3" name="Content Placeholder 2">
-            <a:extLst>
-              <a:ext uri="{FF2B5EF4-FFF2-40B4-BE49-F238E27FC236}">
-                <a16:creationId xmlns:a16="http://schemas.microsoft.com/office/drawing/2014/main" id="{0BACB0A6-0C92-E74B-A969-44B18DF7F9C1}"/>
-              </a:ext>
-            </a:extLst>
-          </p:cNvPr>
-          <p:cNvSpPr>
-            <a:spLocks noGrp="1"/>
-          </p:cNvSpPr>
-          <p:nvPr>
-            <p:ph idx="1"/>
-          </p:nvPr>
-        </p:nvSpPr>
-        <p:spPr/>
-        <p:txBody>
-          <a:bodyPr/>
-          <a:lstStyle/>
-          <a:p>
-            <a:pPr marL="457200" lvl="1" indent="0">
-              <a:buNone/>
-            </a:pPr>
-            <a:endParaRPr lang="en-US" dirty="0"/>
-          </a:p>
-        </p:txBody>
-      </p:sp>
-    </p:spTree>
-    <p:extLst>
-      <p:ext uri="{BB962C8B-B14F-4D97-AF65-F5344CB8AC3E}">
-        <p14:creationId xmlns:p14="http://schemas.microsoft.com/office/powerpoint/2010/main" val="1704424430"/>
-      </p:ext>
-    </p:extLst>
-  </p:cSld>
-  <p:clrMapOvr>
-    <a:masterClrMapping/>
-  </p:clrMapOvr>
-</p:sld>
-</file>
-
 <file path=ppt/slides/slide6.xml><?xml version="1.0" encoding="utf-8"?>
 <p:sld xmlns:a="http://schemas.openxmlformats.org/drawingml/2006/main" xmlns:r="http://schemas.openxmlformats.org/officeDocument/2006/relationships" xmlns:p="http://schemas.openxmlformats.org/presentationml/2006/main">
   <p:cSld>
@@ -4116,7 +4126,7 @@
           <p:cNvPr id="2" name="Title 1">
             <a:extLst>
               <a:ext uri="{FF2B5EF4-FFF2-40B4-BE49-F238E27FC236}">
-                <a16:creationId xmlns:a16="http://schemas.microsoft.com/office/drawing/2014/main" id="{BC770E51-48C5-004C-8F09-94E1081F92B2}"/>
+                <a16:creationId xmlns:a16="http://schemas.microsoft.com/office/drawing/2014/main" id="{2CE79503-F56C-D746-BE73-B513B8732F97}"/>
               </a:ext>
             </a:extLst>
           </p:cNvPr>
@@ -4134,7 +4144,7 @@
           <a:p>
             <a:r>
               <a:rPr lang="en-US" dirty="0"/>
-              <a:t>Project Methodology: Model Construction</a:t>
+              <a:t>Project Methodology: Data Transformation</a:t>
             </a:r>
           </a:p>
         </p:txBody>
@@ -4144,7 +4154,7 @@
           <p:cNvPr id="3" name="Content Placeholder 2">
             <a:extLst>
               <a:ext uri="{FF2B5EF4-FFF2-40B4-BE49-F238E27FC236}">
-                <a16:creationId xmlns:a16="http://schemas.microsoft.com/office/drawing/2014/main" id="{151F85D3-84DE-8143-9B93-A5466724E586}"/>
+                <a16:creationId xmlns:a16="http://schemas.microsoft.com/office/drawing/2014/main" id="{0BACB0A6-0C92-E74B-A969-44B18DF7F9C1}"/>
               </a:ext>
             </a:extLst>
           </p:cNvPr>
@@ -4160,6 +4170,9 @@
           <a:bodyPr/>
           <a:lstStyle/>
           <a:p>
+            <a:pPr marL="457200" lvl="1" indent="0">
+              <a:buNone/>
+            </a:pPr>
             <a:endParaRPr lang="en-US" dirty="0"/>
           </a:p>
         </p:txBody>
@@ -4167,7 +4180,7 @@
     </p:spTree>
     <p:extLst>
       <p:ext uri="{BB962C8B-B14F-4D97-AF65-F5344CB8AC3E}">
-        <p14:creationId xmlns:p14="http://schemas.microsoft.com/office/powerpoint/2010/main" val="3246319365"/>
+        <p14:creationId xmlns:p14="http://schemas.microsoft.com/office/powerpoint/2010/main" val="1704424430"/>
       </p:ext>
     </p:extLst>
   </p:cSld>
@@ -4199,7 +4212,7 @@
           <p:cNvPr id="2" name="Title 1">
             <a:extLst>
               <a:ext uri="{FF2B5EF4-FFF2-40B4-BE49-F238E27FC236}">
-                <a16:creationId xmlns:a16="http://schemas.microsoft.com/office/drawing/2014/main" id="{3F83D6FE-43D2-7F47-B4BE-B6EC0CF92034}"/>
+                <a16:creationId xmlns:a16="http://schemas.microsoft.com/office/drawing/2014/main" id="{BC770E51-48C5-004C-8F09-94E1081F92B2}"/>
               </a:ext>
             </a:extLst>
           </p:cNvPr>
@@ -4217,17 +4230,17 @@
           <a:p>
             <a:r>
               <a:rPr lang="en-US" dirty="0"/>
-              <a:t>Timeline and Strategy Moving Forward</a:t>
-            </a:r>
-          </a:p>
-        </p:txBody>
-      </p:sp>
-      <p:sp>
-        <p:nvSpPr>
-          <p:cNvPr id="5" name="Content Placeholder 2">
-            <a:extLst>
-              <a:ext uri="{FF2B5EF4-FFF2-40B4-BE49-F238E27FC236}">
-                <a16:creationId xmlns:a16="http://schemas.microsoft.com/office/drawing/2014/main" id="{8B661F9C-266B-1642-BC0D-75346B10C917}"/>
+              <a:t>Project Methodology: Model Construction</a:t>
+            </a:r>
+          </a:p>
+        </p:txBody>
+      </p:sp>
+      <p:sp>
+        <p:nvSpPr>
+          <p:cNvPr id="3" name="Content Placeholder 2">
+            <a:extLst>
+              <a:ext uri="{FF2B5EF4-FFF2-40B4-BE49-F238E27FC236}">
+                <a16:creationId xmlns:a16="http://schemas.microsoft.com/office/drawing/2014/main" id="{151F85D3-84DE-8143-9B93-A5466724E586}"/>
               </a:ext>
             </a:extLst>
           </p:cNvPr>
@@ -4238,108 +4251,66 @@
             <p:ph idx="1"/>
           </p:nvPr>
         </p:nvSpPr>
-        <p:spPr>
-          <a:xfrm>
-            <a:off x="838200" y="1825625"/>
-            <a:ext cx="10515600" cy="4351338"/>
-          </a:xfrm>
-        </p:spPr>
-        <p:txBody>
-          <a:bodyPr>
-            <a:normAutofit lnSpcReduction="10000"/>
-          </a:bodyPr>
-          <a:lstStyle/>
-          <a:p>
-            <a:r>
-              <a:rPr lang="en-US" dirty="0"/>
-              <a:t>Timeline?</a:t>
-            </a:r>
-          </a:p>
-          <a:p>
+        <p:spPr/>
+        <p:txBody>
+          <a:bodyPr/>
+          <a:lstStyle/>
+          <a:p>
+            <a:r>
+              <a:rPr lang="en-US" dirty="0"/>
+              <a:t>Spatial Autoregressive Modeling</a:t>
+            </a:r>
+          </a:p>
+          <a:p>
+            <a:r>
+              <a:rPr lang="en-US" dirty="0"/>
+              <a:t>Conditional Autoregressive Modeling vs. Simultaneous</a:t>
+            </a:r>
+          </a:p>
+          <a:p>
+            <a:r>
+              <a:rPr lang="en-US" dirty="0"/>
+              <a:t>Bayesian classifiers, Markov random fields (MRF) </a:t>
+            </a:r>
+          </a:p>
+          <a:p>
+            <a:r>
+              <a:rPr lang="en-US" dirty="0"/>
+              <a:t>Spatial clustering (</a:t>
+            </a:r>
+            <a:r>
+              <a:rPr lang="en-US" dirty="0" err="1"/>
+              <a:t>eg.</a:t>
+            </a:r>
+            <a:r>
+              <a:rPr lang="en-US" dirty="0"/>
+              <a:t> dimensionality reduction combined with clustering algorithm)</a:t>
+            </a:r>
+          </a:p>
+          <a:p>
+            <a:pPr marL="0" indent="0">
+              <a:buNone/>
+            </a:pPr>
             <a:endParaRPr lang="en-US" dirty="0"/>
           </a:p>
           <a:p>
             <a:r>
               <a:rPr lang="en-US" dirty="0"/>
-              <a:t>Logistics</a:t>
-            </a:r>
-          </a:p>
-          <a:p>
-            <a:pPr lvl="1"/>
-            <a:r>
-              <a:rPr lang="en-US" dirty="0"/>
-              <a:t>Generalized content sharing amongst group</a:t>
-            </a:r>
-          </a:p>
-          <a:p>
-            <a:pPr lvl="2"/>
-            <a:r>
-              <a:rPr lang="en-US" dirty="0"/>
-              <a:t>Citation sharing</a:t>
-            </a:r>
-          </a:p>
-          <a:p>
-            <a:pPr lvl="2"/>
-            <a:r>
-              <a:rPr lang="en-US" dirty="0"/>
-              <a:t>Content communications/secure web site</a:t>
-            </a:r>
-          </a:p>
-          <a:p>
-            <a:pPr lvl="1"/>
-            <a:r>
-              <a:rPr lang="en-US" dirty="0"/>
-              <a:t>Code collaboration: </a:t>
-            </a:r>
-            <a:r>
-              <a:rPr lang="en-US" dirty="0" err="1"/>
-              <a:t>Github</a:t>
-            </a:r>
-            <a:r>
-              <a:rPr lang="en-US" dirty="0"/>
-              <a:t> group (</a:t>
-            </a:r>
-            <a:r>
-              <a:rPr lang="en-US" dirty="0">
-                <a:hlinkClick r:id="rId2"/>
-              </a:rPr>
-              <a:t>https://github.com/IMCI-GM</a:t>
-            </a:r>
-            <a:r>
-              <a:rPr lang="en-US" dirty="0"/>
-              <a:t>) </a:t>
-            </a:r>
-          </a:p>
-          <a:p>
-            <a:pPr lvl="1"/>
-            <a:r>
-              <a:rPr lang="en-US" dirty="0"/>
-              <a:t>Data access methods from NKN</a:t>
-            </a:r>
-          </a:p>
-          <a:p>
-            <a:pPr lvl="1"/>
-            <a:r>
-              <a:rPr lang="en-US" dirty="0"/>
-              <a:t>Model code collaboration</a:t>
-            </a:r>
-          </a:p>
-          <a:p>
-            <a:pPr lvl="1"/>
+              <a:t>Python or R?</a:t>
+            </a:r>
+          </a:p>
+          <a:p>
+            <a:pPr marL="0" indent="0">
+              <a:buNone/>
+            </a:pPr>
             <a:endParaRPr lang="en-US" dirty="0"/>
-          </a:p>
-          <a:p>
-            <a:r>
-              <a:rPr lang="en-US" dirty="0"/>
-              <a:t>Tasks moving forward</a:t>
-            </a:r>
           </a:p>
         </p:txBody>
       </p:sp>
     </p:spTree>
     <p:extLst>
       <p:ext uri="{BB962C8B-B14F-4D97-AF65-F5344CB8AC3E}">
-        <p14:creationId xmlns:p14="http://schemas.microsoft.com/office/powerpoint/2010/main" val="3106153405"/>
+        <p14:creationId xmlns:p14="http://schemas.microsoft.com/office/powerpoint/2010/main" val="3246319365"/>
       </p:ext>
     </p:extLst>
   </p:cSld>
@@ -4371,6 +4342,202 @@
           <p:cNvPr id="2" name="Title 1">
             <a:extLst>
               <a:ext uri="{FF2B5EF4-FFF2-40B4-BE49-F238E27FC236}">
+                <a16:creationId xmlns:a16="http://schemas.microsoft.com/office/drawing/2014/main" id="{3F83D6FE-43D2-7F47-B4BE-B6EC0CF92034}"/>
+              </a:ext>
+            </a:extLst>
+          </p:cNvPr>
+          <p:cNvSpPr>
+            <a:spLocks noGrp="1"/>
+          </p:cNvSpPr>
+          <p:nvPr>
+            <p:ph type="title"/>
+          </p:nvPr>
+        </p:nvSpPr>
+        <p:spPr/>
+        <p:txBody>
+          <a:bodyPr/>
+          <a:lstStyle/>
+          <a:p>
+            <a:r>
+              <a:rPr lang="en-US" dirty="0"/>
+              <a:t>Timeline and Strategy Moving Forward</a:t>
+            </a:r>
+          </a:p>
+        </p:txBody>
+      </p:sp>
+      <p:sp>
+        <p:nvSpPr>
+          <p:cNvPr id="5" name="Content Placeholder 2">
+            <a:extLst>
+              <a:ext uri="{FF2B5EF4-FFF2-40B4-BE49-F238E27FC236}">
+                <a16:creationId xmlns:a16="http://schemas.microsoft.com/office/drawing/2014/main" id="{8B661F9C-266B-1642-BC0D-75346B10C917}"/>
+              </a:ext>
+            </a:extLst>
+          </p:cNvPr>
+          <p:cNvSpPr>
+            <a:spLocks noGrp="1"/>
+          </p:cNvSpPr>
+          <p:nvPr>
+            <p:ph idx="1"/>
+          </p:nvPr>
+        </p:nvSpPr>
+        <p:spPr>
+          <a:xfrm>
+            <a:off x="838200" y="1825625"/>
+            <a:ext cx="10515600" cy="4351338"/>
+          </a:xfrm>
+        </p:spPr>
+        <p:txBody>
+          <a:bodyPr>
+            <a:normAutofit lnSpcReduction="10000"/>
+          </a:bodyPr>
+          <a:lstStyle/>
+          <a:p>
+            <a:r>
+              <a:rPr lang="en-US" dirty="0"/>
+              <a:t>Timeline?</a:t>
+            </a:r>
+          </a:p>
+          <a:p>
+            <a:endParaRPr lang="en-US" dirty="0"/>
+          </a:p>
+          <a:p>
+            <a:r>
+              <a:rPr lang="en-US" dirty="0"/>
+              <a:t>Logistics</a:t>
+            </a:r>
+          </a:p>
+          <a:p>
+            <a:pPr lvl="1"/>
+            <a:r>
+              <a:rPr lang="en-US" dirty="0"/>
+              <a:t>Generalized content sharing amongst group</a:t>
+            </a:r>
+          </a:p>
+          <a:p>
+            <a:pPr lvl="2"/>
+            <a:r>
+              <a:rPr lang="en-US" dirty="0"/>
+              <a:t>Citation sharing</a:t>
+            </a:r>
+          </a:p>
+          <a:p>
+            <a:pPr lvl="2"/>
+            <a:r>
+              <a:rPr lang="en-US" dirty="0"/>
+              <a:t>Content communications/secure web site</a:t>
+            </a:r>
+          </a:p>
+          <a:p>
+            <a:pPr lvl="1"/>
+            <a:r>
+              <a:rPr lang="en-US" dirty="0"/>
+              <a:t>Code collaboration: </a:t>
+            </a:r>
+            <a:r>
+              <a:rPr lang="en-US" dirty="0" err="1"/>
+              <a:t>Github</a:t>
+            </a:r>
+            <a:r>
+              <a:rPr lang="en-US" dirty="0"/>
+              <a:t> group (</a:t>
+            </a:r>
+            <a:r>
+              <a:rPr lang="en-US" dirty="0">
+                <a:hlinkClick r:id="rId2"/>
+              </a:rPr>
+              <a:t>https://github.com/IMCI-GM</a:t>
+            </a:r>
+            <a:r>
+              <a:rPr lang="en-US" dirty="0"/>
+              <a:t>) </a:t>
+            </a:r>
+          </a:p>
+          <a:p>
+            <a:pPr lvl="1"/>
+            <a:r>
+              <a:rPr lang="en-US" dirty="0"/>
+              <a:t>Data access methods from NKN</a:t>
+            </a:r>
+          </a:p>
+          <a:p>
+            <a:pPr lvl="1"/>
+            <a:r>
+              <a:rPr lang="en-US" dirty="0"/>
+              <a:t>Model code collaboration (CRC </a:t>
+            </a:r>
+            <a:r>
+              <a:rPr lang="en-US" dirty="0" err="1"/>
+              <a:t>Jupyter</a:t>
+            </a:r>
+            <a:r>
+              <a:rPr lang="en-US" dirty="0"/>
+              <a:t>?  </a:t>
+            </a:r>
+            <a:r>
+              <a:rPr lang="en-US" dirty="0" err="1"/>
+              <a:t>Rstudio</a:t>
+            </a:r>
+            <a:r>
+              <a:rPr lang="en-US" dirty="0"/>
+              <a:t>?  </a:t>
+            </a:r>
+            <a:r>
+              <a:rPr lang="en-US" dirty="0" err="1"/>
+              <a:t>RMarkdown</a:t>
+            </a:r>
+            <a:r>
+              <a:rPr lang="en-US" dirty="0"/>
+              <a:t>?</a:t>
+            </a:r>
+          </a:p>
+          <a:p>
+            <a:pPr lvl="1"/>
+            <a:endParaRPr lang="en-US" dirty="0"/>
+          </a:p>
+          <a:p>
+            <a:r>
+              <a:rPr lang="en-US" dirty="0"/>
+              <a:t>Tasks moving forward</a:t>
+            </a:r>
+          </a:p>
+        </p:txBody>
+      </p:sp>
+    </p:spTree>
+    <p:extLst>
+      <p:ext uri="{BB962C8B-B14F-4D97-AF65-F5344CB8AC3E}">
+        <p14:creationId xmlns:p14="http://schemas.microsoft.com/office/powerpoint/2010/main" val="3106153405"/>
+      </p:ext>
+    </p:extLst>
+  </p:cSld>
+  <p:clrMapOvr>
+    <a:masterClrMapping/>
+  </p:clrMapOvr>
+</p:sld>
+</file>
+
+<file path=ppt/slides/slide9.xml><?xml version="1.0" encoding="utf-8"?>
+<p:sld xmlns:a="http://schemas.openxmlformats.org/drawingml/2006/main" xmlns:r="http://schemas.openxmlformats.org/officeDocument/2006/relationships" xmlns:p="http://schemas.openxmlformats.org/presentationml/2006/main">
+  <p:cSld>
+    <p:spTree>
+      <p:nvGrpSpPr>
+        <p:cNvPr id="1" name=""/>
+        <p:cNvGrpSpPr/>
+        <p:nvPr/>
+      </p:nvGrpSpPr>
+      <p:grpSpPr>
+        <a:xfrm>
+          <a:off x="0" y="0"/>
+          <a:ext cx="0" cy="0"/>
+          <a:chOff x="0" y="0"/>
+          <a:chExt cx="0" cy="0"/>
+        </a:xfrm>
+      </p:grpSpPr>
+      <p:sp>
+        <p:nvSpPr>
+          <p:cNvPr id="2" name="Title 1">
+            <a:extLst>
+              <a:ext uri="{FF2B5EF4-FFF2-40B4-BE49-F238E27FC236}">
                 <a16:creationId xmlns:a16="http://schemas.microsoft.com/office/drawing/2014/main" id="{BC770E51-48C5-004C-8F09-94E1081F92B2}"/>
               </a:ext>
             </a:extLst>
@@ -4389,7 +4556,7 @@
           <a:p>
             <a:r>
               <a:rPr lang="en-US" dirty="0"/>
-              <a:t>Project Methodology: Model Construction</a:t>
+              <a:t>Extra: Literature</a:t>
             </a:r>
           </a:p>
         </p:txBody>
@@ -4536,38 +4703,6 @@
               <a:buNone/>
             </a:pPr>
             <a:endParaRPr lang="en-US" dirty="0"/>
-          </a:p>
-          <a:p>
-            <a:r>
-              <a:rPr lang="en-US" dirty="0"/>
-              <a:t>Spatial Autoregressive Modeling</a:t>
-            </a:r>
-          </a:p>
-          <a:p>
-            <a:r>
-              <a:rPr lang="en-US" dirty="0"/>
-              <a:t>Conditional Autoregressive Modeling vs. Simultaneous</a:t>
-            </a:r>
-          </a:p>
-          <a:p>
-            <a:r>
-              <a:rPr lang="en-US" dirty="0"/>
-              <a:t>Bayesian classifiers, Markov random fields (MRF) </a:t>
-            </a:r>
-          </a:p>
-          <a:p>
-            <a:r>
-              <a:rPr lang="en-US" dirty="0"/>
-              <a:t>Spatial clustering (</a:t>
-            </a:r>
-            <a:r>
-              <a:rPr lang="en-US" dirty="0" err="1"/>
-              <a:t>eg.</a:t>
-            </a:r>
-            <a:r>
-              <a:rPr lang="en-US" dirty="0"/>
-              <a:t> dimensionality reduction combined with clustering algorithm)</a:t>
-            </a:r>
           </a:p>
           <a:p>
             <a:pPr marL="0" indent="0">

</xml_diff>